<commit_message>
Final changes research plan/flash talk slide
</commit_message>
<xml_diff>
--- a/flashtalk/pres_flashtalk.pptx
+++ b/flashtalk/pres_flashtalk.pptx
@@ -1137,51 +1137,6 @@
         </a:p>
       </dgm:t>
     </dgm:pt>
-    <dgm:pt modelId="{AA8DD60F-EF69-044B-8CA8-CE9B38F365CC}">
-      <dgm:prSet/>
-      <dgm:spPr/>
-      <dgm:t>
-        <a:bodyPr/>
-        <a:lstStyle/>
-        <a:p>
-          <a:r>
-            <a:rPr lang="de-DE" dirty="0" err="1" smtClean="0"/>
-            <a:t>Active</a:t>
-          </a:r>
-          <a:r>
-            <a:rPr lang="de-DE" dirty="0" smtClean="0"/>
-            <a:t>/</a:t>
-          </a:r>
-          <a:r>
-            <a:rPr lang="de-DE" dirty="0" err="1" smtClean="0"/>
-            <a:t>Quiet</a:t>
-          </a:r>
-          <a:endParaRPr lang="de-DE" dirty="0"/>
-        </a:p>
-      </dgm:t>
-    </dgm:pt>
-    <dgm:pt modelId="{2D0D9999-6FEE-454A-A7F3-D016E25968C5}" type="parTrans" cxnId="{469B42E0-6F61-E544-BB71-D571D49906F9}">
-      <dgm:prSet/>
-      <dgm:spPr/>
-      <dgm:t>
-        <a:bodyPr/>
-        <a:lstStyle/>
-        <a:p>
-          <a:endParaRPr lang="de-DE"/>
-        </a:p>
-      </dgm:t>
-    </dgm:pt>
-    <dgm:pt modelId="{7D6ACB2C-6B3F-254C-BA42-6EB3812003FA}" type="sibTrans" cxnId="{469B42E0-6F61-E544-BB71-D571D49906F9}">
-      <dgm:prSet/>
-      <dgm:spPr/>
-      <dgm:t>
-        <a:bodyPr/>
-        <a:lstStyle/>
-        <a:p>
-          <a:endParaRPr lang="de-DE"/>
-        </a:p>
-      </dgm:t>
-    </dgm:pt>
     <dgm:pt modelId="{5F2F09ED-375F-9842-ABB5-CFB9068EF84C}" type="pres">
       <dgm:prSet presAssocID="{527476B9-FB08-5241-B794-1660955D5639}" presName="Name0" presStyleCnt="0">
         <dgm:presLayoutVars>
@@ -1225,7 +1180,7 @@
       <dgm:spPr/>
     </dgm:pt>
     <dgm:pt modelId="{64D44F2B-17A2-614A-B321-D162AAEF6ED8}" type="pres">
-      <dgm:prSet presAssocID="{0CCB8812-6F89-8844-A859-8AFE52232241}" presName="conn2-1" presStyleLbl="parChTrans1D2" presStyleIdx="0" presStyleCnt="5"/>
+      <dgm:prSet presAssocID="{0CCB8812-6F89-8844-A859-8AFE52232241}" presName="conn2-1" presStyleLbl="parChTrans1D2" presStyleIdx="0" presStyleCnt="4"/>
       <dgm:spPr/>
       <dgm:t>
         <a:bodyPr/>
@@ -1236,7 +1191,7 @@
       </dgm:t>
     </dgm:pt>
     <dgm:pt modelId="{6C11F1D2-7C6C-304B-9D59-A43D18EAABCB}" type="pres">
-      <dgm:prSet presAssocID="{0CCB8812-6F89-8844-A859-8AFE52232241}" presName="connTx" presStyleLbl="parChTrans1D2" presStyleIdx="0" presStyleCnt="5"/>
+      <dgm:prSet presAssocID="{0CCB8812-6F89-8844-A859-8AFE52232241}" presName="connTx" presStyleLbl="parChTrans1D2" presStyleIdx="0" presStyleCnt="4"/>
       <dgm:spPr/>
       <dgm:t>
         <a:bodyPr/>
@@ -1251,7 +1206,7 @@
       <dgm:spPr/>
     </dgm:pt>
     <dgm:pt modelId="{7745D257-6427-F44F-B604-E3D7FF49AF05}" type="pres">
-      <dgm:prSet presAssocID="{A98FA67B-8154-404A-B7CC-2CCDE0DE9D34}" presName="LevelTwoTextNode" presStyleLbl="node2" presStyleIdx="0" presStyleCnt="5">
+      <dgm:prSet presAssocID="{A98FA67B-8154-404A-B7CC-2CCDE0DE9D34}" presName="LevelTwoTextNode" presStyleLbl="node2" presStyleIdx="0" presStyleCnt="4">
         <dgm:presLayoutVars>
           <dgm:chPref val="3"/>
         </dgm:presLayoutVars>
@@ -1270,7 +1225,7 @@
       <dgm:spPr/>
     </dgm:pt>
     <dgm:pt modelId="{C2EA1BA6-76E9-FB40-A89D-4923841736E9}" type="pres">
-      <dgm:prSet presAssocID="{254DE487-DB24-104A-8651-FE65134CA4D0}" presName="conn2-1" presStyleLbl="parChTrans1D2" presStyleIdx="1" presStyleCnt="5"/>
+      <dgm:prSet presAssocID="{254DE487-DB24-104A-8651-FE65134CA4D0}" presName="conn2-1" presStyleLbl="parChTrans1D2" presStyleIdx="1" presStyleCnt="4"/>
       <dgm:spPr/>
       <dgm:t>
         <a:bodyPr/>
@@ -1281,7 +1236,7 @@
       </dgm:t>
     </dgm:pt>
     <dgm:pt modelId="{857F7FA3-AC1E-D94C-9271-C94961B92DB6}" type="pres">
-      <dgm:prSet presAssocID="{254DE487-DB24-104A-8651-FE65134CA4D0}" presName="connTx" presStyleLbl="parChTrans1D2" presStyleIdx="1" presStyleCnt="5"/>
+      <dgm:prSet presAssocID="{254DE487-DB24-104A-8651-FE65134CA4D0}" presName="connTx" presStyleLbl="parChTrans1D2" presStyleIdx="1" presStyleCnt="4"/>
       <dgm:spPr/>
       <dgm:t>
         <a:bodyPr/>
@@ -1296,7 +1251,7 @@
       <dgm:spPr/>
     </dgm:pt>
     <dgm:pt modelId="{D675B78E-6E43-634B-8A42-ED4F8054297D}" type="pres">
-      <dgm:prSet presAssocID="{07E96AAD-2F6B-E140-9300-74CED3A6C468}" presName="LevelTwoTextNode" presStyleLbl="node2" presStyleIdx="1" presStyleCnt="5">
+      <dgm:prSet presAssocID="{07E96AAD-2F6B-E140-9300-74CED3A6C468}" presName="LevelTwoTextNode" presStyleLbl="node2" presStyleIdx="1" presStyleCnt="4">
         <dgm:presLayoutVars>
           <dgm:chPref val="3"/>
         </dgm:presLayoutVars>
@@ -1315,7 +1270,7 @@
       <dgm:spPr/>
     </dgm:pt>
     <dgm:pt modelId="{3C6BF30B-0D70-DA48-8969-B76A21AA043B}" type="pres">
-      <dgm:prSet presAssocID="{5B1972AD-C9BB-5C40-909E-B648EB0AB28C}" presName="conn2-1" presStyleLbl="parChTrans1D2" presStyleIdx="2" presStyleCnt="5"/>
+      <dgm:prSet presAssocID="{5B1972AD-C9BB-5C40-909E-B648EB0AB28C}" presName="conn2-1" presStyleLbl="parChTrans1D2" presStyleIdx="2" presStyleCnt="4"/>
       <dgm:spPr/>
       <dgm:t>
         <a:bodyPr/>
@@ -1326,7 +1281,7 @@
       </dgm:t>
     </dgm:pt>
     <dgm:pt modelId="{3F284AE2-CA06-0A44-AF10-10220357A832}" type="pres">
-      <dgm:prSet presAssocID="{5B1972AD-C9BB-5C40-909E-B648EB0AB28C}" presName="connTx" presStyleLbl="parChTrans1D2" presStyleIdx="2" presStyleCnt="5"/>
+      <dgm:prSet presAssocID="{5B1972AD-C9BB-5C40-909E-B648EB0AB28C}" presName="connTx" presStyleLbl="parChTrans1D2" presStyleIdx="2" presStyleCnt="4"/>
       <dgm:spPr/>
       <dgm:t>
         <a:bodyPr/>
@@ -1341,7 +1296,7 @@
       <dgm:spPr/>
     </dgm:pt>
     <dgm:pt modelId="{3570616F-1FCB-E24E-88BD-834DA0ED7535}" type="pres">
-      <dgm:prSet presAssocID="{72383443-5387-9241-9110-9081847E5AEF}" presName="LevelTwoTextNode" presStyleLbl="node2" presStyleIdx="2" presStyleCnt="5">
+      <dgm:prSet presAssocID="{72383443-5387-9241-9110-9081847E5AEF}" presName="LevelTwoTextNode" presStyleLbl="node2" presStyleIdx="2" presStyleCnt="4">
         <dgm:presLayoutVars>
           <dgm:chPref val="3"/>
         </dgm:presLayoutVars>
@@ -1360,7 +1315,7 @@
       <dgm:spPr/>
     </dgm:pt>
     <dgm:pt modelId="{7F7DB70D-D393-714F-B5BA-57FEEFD6D570}" type="pres">
-      <dgm:prSet presAssocID="{8FF8F551-8235-9B47-8B0D-C5EA80560132}" presName="conn2-1" presStyleLbl="parChTrans1D2" presStyleIdx="3" presStyleCnt="5"/>
+      <dgm:prSet presAssocID="{8FF8F551-8235-9B47-8B0D-C5EA80560132}" presName="conn2-1" presStyleLbl="parChTrans1D2" presStyleIdx="3" presStyleCnt="4"/>
       <dgm:spPr/>
       <dgm:t>
         <a:bodyPr/>
@@ -1371,7 +1326,7 @@
       </dgm:t>
     </dgm:pt>
     <dgm:pt modelId="{527DC7C5-F4B4-504B-9909-CF6A13655073}" type="pres">
-      <dgm:prSet presAssocID="{8FF8F551-8235-9B47-8B0D-C5EA80560132}" presName="connTx" presStyleLbl="parChTrans1D2" presStyleIdx="3" presStyleCnt="5"/>
+      <dgm:prSet presAssocID="{8FF8F551-8235-9B47-8B0D-C5EA80560132}" presName="connTx" presStyleLbl="parChTrans1D2" presStyleIdx="3" presStyleCnt="4"/>
       <dgm:spPr/>
       <dgm:t>
         <a:bodyPr/>
@@ -1386,7 +1341,7 @@
       <dgm:spPr/>
     </dgm:pt>
     <dgm:pt modelId="{02883786-C2FF-334D-8263-725FBF29D864}" type="pres">
-      <dgm:prSet presAssocID="{FEE4FCE0-ABA5-4E4F-9667-AFE0D22D1998}" presName="LevelTwoTextNode" presStyleLbl="node2" presStyleIdx="3" presStyleCnt="5">
+      <dgm:prSet presAssocID="{FEE4FCE0-ABA5-4E4F-9667-AFE0D22D1998}" presName="LevelTwoTextNode" presStyleLbl="node2" presStyleIdx="3" presStyleCnt="4">
         <dgm:presLayoutVars>
           <dgm:chPref val="3"/>
         </dgm:presLayoutVars>
@@ -1404,56 +1359,10 @@
       <dgm:prSet presAssocID="{FEE4FCE0-ABA5-4E4F-9667-AFE0D22D1998}" presName="level3hierChild" presStyleCnt="0"/>
       <dgm:spPr/>
     </dgm:pt>
-    <dgm:pt modelId="{A2ADB18B-9FBC-3A4E-B34A-5438A5123F42}" type="pres">
-      <dgm:prSet presAssocID="{2D0D9999-6FEE-454A-A7F3-D016E25968C5}" presName="conn2-1" presStyleLbl="parChTrans1D2" presStyleIdx="4" presStyleCnt="5"/>
-      <dgm:spPr/>
-      <dgm:t>
-        <a:bodyPr/>
-        <a:lstStyle/>
-        <a:p>
-          <a:endParaRPr lang="de-DE"/>
-        </a:p>
-      </dgm:t>
-    </dgm:pt>
-    <dgm:pt modelId="{7C73739D-06B1-8A4D-AAB3-7BC2182DC732}" type="pres">
-      <dgm:prSet presAssocID="{2D0D9999-6FEE-454A-A7F3-D016E25968C5}" presName="connTx" presStyleLbl="parChTrans1D2" presStyleIdx="4" presStyleCnt="5"/>
-      <dgm:spPr/>
-      <dgm:t>
-        <a:bodyPr/>
-        <a:lstStyle/>
-        <a:p>
-          <a:endParaRPr lang="de-DE"/>
-        </a:p>
-      </dgm:t>
-    </dgm:pt>
-    <dgm:pt modelId="{8FC36551-EB85-474C-8D72-016BABB1CEB0}" type="pres">
-      <dgm:prSet presAssocID="{AA8DD60F-EF69-044B-8CA8-CE9B38F365CC}" presName="root2" presStyleCnt="0"/>
-      <dgm:spPr/>
-    </dgm:pt>
-    <dgm:pt modelId="{ECE76F66-D6DB-F54A-9A6B-BD26856E0A24}" type="pres">
-      <dgm:prSet presAssocID="{AA8DD60F-EF69-044B-8CA8-CE9B38F365CC}" presName="LevelTwoTextNode" presStyleLbl="node2" presStyleIdx="4" presStyleCnt="5">
-        <dgm:presLayoutVars>
-          <dgm:chPref val="3"/>
-        </dgm:presLayoutVars>
-      </dgm:prSet>
-      <dgm:spPr/>
-      <dgm:t>
-        <a:bodyPr/>
-        <a:lstStyle/>
-        <a:p>
-          <a:endParaRPr lang="de-DE"/>
-        </a:p>
-      </dgm:t>
-    </dgm:pt>
-    <dgm:pt modelId="{81767188-96CC-2D46-B71F-B5755745809E}" type="pres">
-      <dgm:prSet presAssocID="{AA8DD60F-EF69-044B-8CA8-CE9B38F365CC}" presName="level3hierChild" presStyleCnt="0"/>
-      <dgm:spPr/>
-    </dgm:pt>
   </dgm:ptLst>
   <dgm:cxnLst>
     <dgm:cxn modelId="{3E0122C2-4F12-BF46-80B1-4F5BDA4910A5}" type="presOf" srcId="{5B1972AD-C9BB-5C40-909E-B648EB0AB28C}" destId="{3F284AE2-CA06-0A44-AF10-10220357A832}" srcOrd="1" destOrd="0" presId="urn:microsoft.com/office/officeart/2008/layout/HorizontalMultiLevelHierarchy"/>
     <dgm:cxn modelId="{1FBEBDA4-A580-674E-802A-A2EAE118F2BE}" srcId="{527476B9-FB08-5241-B794-1660955D5639}" destId="{968DE229-B8E2-724D-BDC4-5EFBED6796F3}" srcOrd="0" destOrd="0" parTransId="{B24A503E-9096-644C-8252-EFD43A7C0673}" sibTransId="{188AAD12-075A-D842-9239-8A1117D20826}"/>
-    <dgm:cxn modelId="{0362B61A-ACDC-B849-858D-696F9D348A29}" type="presOf" srcId="{2D0D9999-6FEE-454A-A7F3-D016E25968C5}" destId="{A2ADB18B-9FBC-3A4E-B34A-5438A5123F42}" srcOrd="0" destOrd="0" presId="urn:microsoft.com/office/officeart/2008/layout/HorizontalMultiLevelHierarchy"/>
     <dgm:cxn modelId="{DADFB7CC-2729-9C4A-8D79-AF14E84B9903}" type="presOf" srcId="{72383443-5387-9241-9110-9081847E5AEF}" destId="{3570616F-1FCB-E24E-88BD-834DA0ED7535}" srcOrd="0" destOrd="0" presId="urn:microsoft.com/office/officeart/2008/layout/HorizontalMultiLevelHierarchy"/>
     <dgm:cxn modelId="{DA3E752F-8A1A-B047-AAA6-EC4E40323873}" type="presOf" srcId="{0CCB8812-6F89-8844-A859-8AFE52232241}" destId="{64D44F2B-17A2-614A-B321-D162AAEF6ED8}" srcOrd="0" destOrd="0" presId="urn:microsoft.com/office/officeart/2008/layout/HorizontalMultiLevelHierarchy"/>
     <dgm:cxn modelId="{06B12991-53F7-7641-9F5E-C97677F5973D}" type="presOf" srcId="{8FF8F551-8235-9B47-8B0D-C5EA80560132}" destId="{7F7DB70D-D393-714F-B5BA-57FEEFD6D570}" srcOrd="0" destOrd="0" presId="urn:microsoft.com/office/officeart/2008/layout/HorizontalMultiLevelHierarchy"/>
@@ -1467,13 +1376,10 @@
     <dgm:cxn modelId="{4075FB5A-1277-6246-BEA6-415AAD55A6DB}" type="presOf" srcId="{FEE4FCE0-ABA5-4E4F-9667-AFE0D22D1998}" destId="{02883786-C2FF-334D-8263-725FBF29D864}" srcOrd="0" destOrd="0" presId="urn:microsoft.com/office/officeart/2008/layout/HorizontalMultiLevelHierarchy"/>
     <dgm:cxn modelId="{CCD95E37-529C-2946-A257-F62645FB6615}" srcId="{968DE229-B8E2-724D-BDC4-5EFBED6796F3}" destId="{07E96AAD-2F6B-E140-9300-74CED3A6C468}" srcOrd="1" destOrd="0" parTransId="{254DE487-DB24-104A-8651-FE65134CA4D0}" sibTransId="{9FA17290-9BB0-AE42-9F27-D684D9251B17}"/>
     <dgm:cxn modelId="{0B9D8181-F130-9E42-B0C0-65F349A3604D}" type="presOf" srcId="{527476B9-FB08-5241-B794-1660955D5639}" destId="{5F2F09ED-375F-9842-ABB5-CFB9068EF84C}" srcOrd="0" destOrd="0" presId="urn:microsoft.com/office/officeart/2008/layout/HorizontalMultiLevelHierarchy"/>
-    <dgm:cxn modelId="{4E7CDDC5-244E-B444-9BC0-DA5D06E58CC6}" type="presOf" srcId="{AA8DD60F-EF69-044B-8CA8-CE9B38F365CC}" destId="{ECE76F66-D6DB-F54A-9A6B-BD26856E0A24}" srcOrd="0" destOrd="0" presId="urn:microsoft.com/office/officeart/2008/layout/HorizontalMultiLevelHierarchy"/>
     <dgm:cxn modelId="{8128E159-670B-6B45-8051-2F6CC799C958}" type="presOf" srcId="{8FF8F551-8235-9B47-8B0D-C5EA80560132}" destId="{527DC7C5-F4B4-504B-9909-CF6A13655073}" srcOrd="1" destOrd="0" presId="urn:microsoft.com/office/officeart/2008/layout/HorizontalMultiLevelHierarchy"/>
     <dgm:cxn modelId="{3075C81A-B400-9743-A7B0-CD704FF81E0E}" srcId="{968DE229-B8E2-724D-BDC4-5EFBED6796F3}" destId="{FEE4FCE0-ABA5-4E4F-9667-AFE0D22D1998}" srcOrd="3" destOrd="0" parTransId="{8FF8F551-8235-9B47-8B0D-C5EA80560132}" sibTransId="{60709ED1-9BAC-2D49-9FF4-6EEAAA00EE22}"/>
     <dgm:cxn modelId="{39293A59-8C50-8D43-B846-C0754CB79611}" type="presOf" srcId="{254DE487-DB24-104A-8651-FE65134CA4D0}" destId="{C2EA1BA6-76E9-FB40-A89D-4923841736E9}" srcOrd="0" destOrd="0" presId="urn:microsoft.com/office/officeart/2008/layout/HorizontalMultiLevelHierarchy"/>
     <dgm:cxn modelId="{819F8313-9C49-DC4D-93DA-14BF1D8F4F47}" srcId="{968DE229-B8E2-724D-BDC4-5EFBED6796F3}" destId="{72383443-5387-9241-9110-9081847E5AEF}" srcOrd="2" destOrd="0" parTransId="{5B1972AD-C9BB-5C40-909E-B648EB0AB28C}" sibTransId="{B5DF0257-7C7D-8A4C-AA54-7CA4C3278143}"/>
-    <dgm:cxn modelId="{7E057F7A-838A-C34B-986E-0AD918646C3F}" type="presOf" srcId="{2D0D9999-6FEE-454A-A7F3-D016E25968C5}" destId="{7C73739D-06B1-8A4D-AAB3-7BC2182DC732}" srcOrd="1" destOrd="0" presId="urn:microsoft.com/office/officeart/2008/layout/HorizontalMultiLevelHierarchy"/>
-    <dgm:cxn modelId="{469B42E0-6F61-E544-BB71-D571D49906F9}" srcId="{968DE229-B8E2-724D-BDC4-5EFBED6796F3}" destId="{AA8DD60F-EF69-044B-8CA8-CE9B38F365CC}" srcOrd="4" destOrd="0" parTransId="{2D0D9999-6FEE-454A-A7F3-D016E25968C5}" sibTransId="{7D6ACB2C-6B3F-254C-BA42-6EB3812003FA}"/>
     <dgm:cxn modelId="{04F66AEA-EB3A-A749-8A20-90E2FFDD63C9}" type="presParOf" srcId="{5F2F09ED-375F-9842-ABB5-CFB9068EF84C}" destId="{C7E757B6-2191-A945-A893-1E68F4C2CCDC}" srcOrd="0" destOrd="0" presId="urn:microsoft.com/office/officeart/2008/layout/HorizontalMultiLevelHierarchy"/>
     <dgm:cxn modelId="{4F91B30C-B97B-B846-8ED9-0D07CCEFE6E2}" type="presParOf" srcId="{C7E757B6-2191-A945-A893-1E68F4C2CCDC}" destId="{0894E6F6-C392-0044-A6B1-FCD71311AC89}" srcOrd="0" destOrd="0" presId="urn:microsoft.com/office/officeart/2008/layout/HorizontalMultiLevelHierarchy"/>
     <dgm:cxn modelId="{C7B6066F-5CF1-0C48-9487-6BCC72781A65}" type="presParOf" srcId="{C7E757B6-2191-A945-A893-1E68F4C2CCDC}" destId="{7243EE0F-679C-AF49-88CB-04AC8F5DE21F}" srcOrd="1" destOrd="0" presId="urn:microsoft.com/office/officeart/2008/layout/HorizontalMultiLevelHierarchy"/>
@@ -1497,11 +1403,6 @@
     <dgm:cxn modelId="{9582407E-D24B-8548-904D-8E08893CBD6F}" type="presParOf" srcId="{7243EE0F-679C-AF49-88CB-04AC8F5DE21F}" destId="{E8EFBED5-8ED9-DD43-9F87-42A6DB9EBFF7}" srcOrd="7" destOrd="0" presId="urn:microsoft.com/office/officeart/2008/layout/HorizontalMultiLevelHierarchy"/>
     <dgm:cxn modelId="{BFF79343-CC73-9945-A594-A2B571FE63A2}" type="presParOf" srcId="{E8EFBED5-8ED9-DD43-9F87-42A6DB9EBFF7}" destId="{02883786-C2FF-334D-8263-725FBF29D864}" srcOrd="0" destOrd="0" presId="urn:microsoft.com/office/officeart/2008/layout/HorizontalMultiLevelHierarchy"/>
     <dgm:cxn modelId="{DE04E25F-95EA-B240-B613-674F0C0EF2A4}" type="presParOf" srcId="{E8EFBED5-8ED9-DD43-9F87-42A6DB9EBFF7}" destId="{64EBDBB3-26E7-1D46-8238-FBD0FD1E8F5D}" srcOrd="1" destOrd="0" presId="urn:microsoft.com/office/officeart/2008/layout/HorizontalMultiLevelHierarchy"/>
-    <dgm:cxn modelId="{DDD107AC-2DA5-4441-AF26-75A7CF68086A}" type="presParOf" srcId="{7243EE0F-679C-AF49-88CB-04AC8F5DE21F}" destId="{A2ADB18B-9FBC-3A4E-B34A-5438A5123F42}" srcOrd="8" destOrd="0" presId="urn:microsoft.com/office/officeart/2008/layout/HorizontalMultiLevelHierarchy"/>
-    <dgm:cxn modelId="{03584B21-D44B-214E-BEE6-1232E35BF754}" type="presParOf" srcId="{A2ADB18B-9FBC-3A4E-B34A-5438A5123F42}" destId="{7C73739D-06B1-8A4D-AAB3-7BC2182DC732}" srcOrd="0" destOrd="0" presId="urn:microsoft.com/office/officeart/2008/layout/HorizontalMultiLevelHierarchy"/>
-    <dgm:cxn modelId="{47A20E05-D91F-7947-9A26-8B43B90356C4}" type="presParOf" srcId="{7243EE0F-679C-AF49-88CB-04AC8F5DE21F}" destId="{8FC36551-EB85-474C-8D72-016BABB1CEB0}" srcOrd="9" destOrd="0" presId="urn:microsoft.com/office/officeart/2008/layout/HorizontalMultiLevelHierarchy"/>
-    <dgm:cxn modelId="{AEA50434-EACA-3647-9CD3-EB0A8434BD7E}" type="presParOf" srcId="{8FC36551-EB85-474C-8D72-016BABB1CEB0}" destId="{ECE76F66-D6DB-F54A-9A6B-BD26856E0A24}" srcOrd="0" destOrd="0" presId="urn:microsoft.com/office/officeart/2008/layout/HorizontalMultiLevelHierarchy"/>
-    <dgm:cxn modelId="{585C8EA4-B265-2A4D-B8AB-1F6177172443}" type="presParOf" srcId="{8FC36551-EB85-474C-8D72-016BABB1CEB0}" destId="{81767188-96CC-2D46-B71F-B5755745809E}" srcOrd="1" destOrd="0" presId="urn:microsoft.com/office/officeart/2008/layout/HorizontalMultiLevelHierarchy"/>
   </dgm:cxnLst>
   <dgm:bg/>
   <dgm:whole/>
@@ -1521,15 +1422,15 @@
       <dsp:cNvGrpSpPr/>
     </dsp:nvGrpSpPr>
     <dsp:grpSpPr/>
-    <dsp:sp modelId="{A2ADB18B-9FBC-3A4E-B34A-5438A5123F42}">
+    <dsp:sp modelId="{7F7DB70D-D393-714F-B5BA-57FEEFD6D570}">
       <dsp:nvSpPr>
         <dsp:cNvPr id="0" name=""/>
         <dsp:cNvSpPr/>
       </dsp:nvSpPr>
       <dsp:spPr>
         <a:xfrm>
-          <a:off x="1021513" y="2106612"/>
-          <a:ext cx="460519" cy="1755030"/>
+          <a:off x="876914" y="2106612"/>
+          <a:ext cx="525136" cy="1500961"/>
         </a:xfrm>
         <a:custGeom>
           <a:avLst/>
@@ -1543,103 +1444,13 @@
                 <a:pt x="0" y="0"/>
               </a:moveTo>
               <a:lnTo>
-                <a:pt x="230259" y="0"/>
+                <a:pt x="262568" y="0"/>
               </a:lnTo>
               <a:lnTo>
-                <a:pt x="230259" y="1755030"/>
+                <a:pt x="262568" y="1500961"/>
               </a:lnTo>
               <a:lnTo>
-                <a:pt x="460519" y="1755030"/>
-              </a:lnTo>
-            </a:path>
-          </a:pathLst>
-        </a:custGeom>
-        <a:noFill/>
-        <a:ln w="25400" cap="rnd" cmpd="sng" algn="ctr">
-          <a:solidFill>
-            <a:schemeClr val="dk2">
-              <a:shade val="60000"/>
-              <a:hueOff val="0"/>
-              <a:satOff val="0"/>
-              <a:lumOff val="0"/>
-              <a:alphaOff val="0"/>
-            </a:schemeClr>
-          </a:solidFill>
-          <a:prstDash val="solid"/>
-        </a:ln>
-        <a:effectLst/>
-        <a:scene3d>
-          <a:camera prst="orthographicFront"/>
-          <a:lightRig rig="flat" dir="t"/>
-        </a:scene3d>
-        <a:sp3d prstMaterial="matte"/>
-      </dsp:spPr>
-      <dsp:style>
-        <a:lnRef idx="2">
-          <a:scrgbClr r="0" g="0" b="0"/>
-        </a:lnRef>
-        <a:fillRef idx="0">
-          <a:scrgbClr r="0" g="0" b="0"/>
-        </a:fillRef>
-        <a:effectRef idx="0">
-          <a:scrgbClr r="0" g="0" b="0"/>
-        </a:effectRef>
-        <a:fontRef idx="minor"/>
-      </dsp:style>
-      <dsp:txBody>
-        <a:bodyPr spcFirstLastPara="0" vert="horz" wrap="square" lIns="12700" tIns="0" rIns="12700" bIns="0" numCol="1" spcCol="1270" anchor="ctr" anchorCtr="0">
-          <a:noAutofit/>
-        </a:bodyPr>
-        <a:lstStyle/>
-        <a:p>
-          <a:pPr lvl="0" algn="ctr" defTabSz="266700">
-            <a:lnSpc>
-              <a:spcPct val="90000"/>
-            </a:lnSpc>
-            <a:spcBef>
-              <a:spcPct val="0"/>
-            </a:spcBef>
-            <a:spcAft>
-              <a:spcPct val="35000"/>
-            </a:spcAft>
-          </a:pPr>
-          <a:endParaRPr lang="de-DE" sz="600" kern="1200"/>
-        </a:p>
-      </dsp:txBody>
-      <dsp:txXfrm>
-        <a:off x="1206412" y="2938766"/>
-        <a:ext cx="90722" cy="90722"/>
-      </dsp:txXfrm>
-    </dsp:sp>
-    <dsp:sp modelId="{7F7DB70D-D393-714F-B5BA-57FEEFD6D570}">
-      <dsp:nvSpPr>
-        <dsp:cNvPr id="0" name=""/>
-        <dsp:cNvSpPr/>
-      </dsp:nvSpPr>
-      <dsp:spPr>
-        <a:xfrm>
-          <a:off x="1021513" y="2106612"/>
-          <a:ext cx="460519" cy="877515"/>
-        </a:xfrm>
-        <a:custGeom>
-          <a:avLst/>
-          <a:gdLst/>
-          <a:ahLst/>
-          <a:cxnLst/>
-          <a:rect l="0" t="0" r="0" b="0"/>
-          <a:pathLst>
-            <a:path>
-              <a:moveTo>
-                <a:pt x="0" y="0"/>
-              </a:moveTo>
-              <a:lnTo>
-                <a:pt x="230259" y="0"/>
-              </a:lnTo>
-              <a:lnTo>
-                <a:pt x="230259" y="877515"/>
-              </a:lnTo>
-              <a:lnTo>
-                <a:pt x="460519" y="877515"/>
+                <a:pt x="525136" y="1500961"/>
               </a:lnTo>
             </a:path>
           </a:pathLst>
@@ -1697,8 +1508,8 @@
         </a:p>
       </dsp:txBody>
       <dsp:txXfrm>
-        <a:off x="1226997" y="2520594"/>
-        <a:ext cx="49550" cy="49550"/>
+        <a:off x="1099728" y="2817338"/>
+        <a:ext cx="79508" cy="79508"/>
       </dsp:txXfrm>
     </dsp:sp>
     <dsp:sp modelId="{3C6BF30B-0D70-DA48-8969-B76A21AA043B}">
@@ -1708,8 +1519,8 @@
       </dsp:nvSpPr>
       <dsp:spPr>
         <a:xfrm>
-          <a:off x="1021513" y="2060892"/>
-          <a:ext cx="460519" cy="91440"/>
+          <a:off x="876914" y="2106612"/>
+          <a:ext cx="525136" cy="500320"/>
         </a:xfrm>
         <a:custGeom>
           <a:avLst/>
@@ -1720,10 +1531,16 @@
           <a:pathLst>
             <a:path>
               <a:moveTo>
-                <a:pt x="0" y="45720"/>
+                <a:pt x="0" y="0"/>
               </a:moveTo>
               <a:lnTo>
-                <a:pt x="460519" y="45720"/>
+                <a:pt x="262568" y="0"/>
+              </a:lnTo>
+              <a:lnTo>
+                <a:pt x="262568" y="500320"/>
+              </a:lnTo>
+              <a:lnTo>
+                <a:pt x="525136" y="500320"/>
               </a:lnTo>
             </a:path>
           </a:pathLst>
@@ -1781,8 +1598,8 @@
         </a:p>
       </dsp:txBody>
       <dsp:txXfrm>
-        <a:off x="1240260" y="2095099"/>
-        <a:ext cx="23025" cy="23025"/>
+        <a:off x="1121349" y="2338639"/>
+        <a:ext cx="36265" cy="36265"/>
       </dsp:txXfrm>
     </dsp:sp>
     <dsp:sp modelId="{C2EA1BA6-76E9-FB40-A89D-4923841736E9}">
@@ -1792,8 +1609,8 @@
       </dsp:nvSpPr>
       <dsp:spPr>
         <a:xfrm>
-          <a:off x="1021513" y="1229097"/>
-          <a:ext cx="460519" cy="877515"/>
+          <a:off x="876914" y="1606292"/>
+          <a:ext cx="525136" cy="500320"/>
         </a:xfrm>
         <a:custGeom>
           <a:avLst/>
@@ -1804,16 +1621,16 @@
           <a:pathLst>
             <a:path>
               <a:moveTo>
-                <a:pt x="0" y="877515"/>
+                <a:pt x="0" y="500320"/>
               </a:moveTo>
               <a:lnTo>
-                <a:pt x="230259" y="877515"/>
+                <a:pt x="262568" y="500320"/>
               </a:lnTo>
               <a:lnTo>
-                <a:pt x="230259" y="0"/>
+                <a:pt x="262568" y="0"/>
               </a:lnTo>
               <a:lnTo>
-                <a:pt x="460519" y="0"/>
+                <a:pt x="525136" y="0"/>
               </a:lnTo>
             </a:path>
           </a:pathLst>
@@ -1871,8 +1688,8 @@
         </a:p>
       </dsp:txBody>
       <dsp:txXfrm>
-        <a:off x="1226997" y="1643079"/>
-        <a:ext cx="49550" cy="49550"/>
+        <a:off x="1121349" y="1838319"/>
+        <a:ext cx="36265" cy="36265"/>
       </dsp:txXfrm>
     </dsp:sp>
     <dsp:sp modelId="{64D44F2B-17A2-614A-B321-D162AAEF6ED8}">
@@ -1882,8 +1699,8 @@
       </dsp:nvSpPr>
       <dsp:spPr>
         <a:xfrm>
-          <a:off x="1021513" y="351582"/>
-          <a:ext cx="460519" cy="1755030"/>
+          <a:off x="876914" y="605651"/>
+          <a:ext cx="525136" cy="1500961"/>
         </a:xfrm>
         <a:custGeom>
           <a:avLst/>
@@ -1894,16 +1711,16 @@
           <a:pathLst>
             <a:path>
               <a:moveTo>
-                <a:pt x="0" y="1755030"/>
+                <a:pt x="0" y="1500961"/>
               </a:moveTo>
               <a:lnTo>
-                <a:pt x="230259" y="1755030"/>
+                <a:pt x="262568" y="1500961"/>
               </a:lnTo>
               <a:lnTo>
-                <a:pt x="230259" y="0"/>
+                <a:pt x="262568" y="0"/>
               </a:lnTo>
               <a:lnTo>
-                <a:pt x="460519" y="0"/>
+                <a:pt x="525136" y="0"/>
               </a:lnTo>
             </a:path>
           </a:pathLst>
@@ -1946,7 +1763,7 @@
         </a:bodyPr>
         <a:lstStyle/>
         <a:p>
-          <a:pPr lvl="0" algn="ctr" defTabSz="266700">
+          <a:pPr lvl="0" algn="ctr" defTabSz="222250">
             <a:lnSpc>
               <a:spcPct val="90000"/>
             </a:lnSpc>
@@ -1957,12 +1774,12 @@
               <a:spcPct val="35000"/>
             </a:spcAft>
           </a:pPr>
-          <a:endParaRPr lang="de-DE" sz="600" kern="1200"/>
+          <a:endParaRPr lang="de-DE" sz="500" kern="1200"/>
         </a:p>
       </dsp:txBody>
       <dsp:txXfrm>
-        <a:off x="1206412" y="1183736"/>
-        <a:ext cx="90722" cy="90722"/>
+        <a:off x="1099728" y="1316377"/>
+        <a:ext cx="79508" cy="79508"/>
       </dsp:txXfrm>
     </dsp:sp>
     <dsp:sp modelId="{0894E6F6-C392-0044-A6B1-FCD71311AC89}">
@@ -1972,8 +1789,8 @@
       </dsp:nvSpPr>
       <dsp:spPr>
         <a:xfrm rot="16200000">
-          <a:off x="-1176893" y="1755606"/>
-          <a:ext cx="3694800" cy="702012"/>
+          <a:off x="-1629954" y="1706356"/>
+          <a:ext cx="4213225" cy="800512"/>
         </a:xfrm>
         <a:prstGeom prst="rect">
           <a:avLst/>
@@ -2047,12 +1864,12 @@
         </a:fontRef>
       </dsp:style>
       <dsp:txBody>
-        <a:bodyPr spcFirstLastPara="0" vert="horz" wrap="square" lIns="29210" tIns="29210" rIns="29210" bIns="29210" numCol="1" spcCol="1270" anchor="ctr" anchorCtr="0">
+        <a:bodyPr spcFirstLastPara="0" vert="horz" wrap="square" lIns="33020" tIns="33020" rIns="33020" bIns="33020" numCol="1" spcCol="1270" anchor="ctr" anchorCtr="0">
           <a:noAutofit/>
         </a:bodyPr>
         <a:lstStyle/>
         <a:p>
-          <a:pPr lvl="0" algn="ctr" defTabSz="2044700">
+          <a:pPr lvl="0" algn="ctr" defTabSz="2311400">
             <a:lnSpc>
               <a:spcPct val="90000"/>
             </a:lnSpc>
@@ -2064,15 +1881,15 @@
             </a:spcAft>
           </a:pPr>
           <a:r>
-            <a:rPr lang="de-DE" sz="4600" kern="1200" dirty="0" err="1" smtClean="0"/>
+            <a:rPr lang="de-DE" sz="5200" kern="1200" dirty="0" err="1" smtClean="0"/>
             <a:t>Civilian</a:t>
           </a:r>
-          <a:endParaRPr lang="de-DE" sz="4600" kern="1200" dirty="0"/>
+          <a:endParaRPr lang="de-DE" sz="5200" kern="1200" dirty="0"/>
         </a:p>
       </dsp:txBody>
       <dsp:txXfrm>
-        <a:off x="-1176893" y="1755606"/>
-        <a:ext cx="3694800" cy="702012"/>
+        <a:off x="-1629954" y="1706356"/>
+        <a:ext cx="4213225" cy="800512"/>
       </dsp:txXfrm>
     </dsp:sp>
     <dsp:sp modelId="{7745D257-6427-F44F-B604-E3D7FF49AF05}">
@@ -2082,8 +1899,8 @@
       </dsp:nvSpPr>
       <dsp:spPr>
         <a:xfrm>
-          <a:off x="1482033" y="576"/>
-          <a:ext cx="2302599" cy="702012"/>
+          <a:off x="1402050" y="205394"/>
+          <a:ext cx="2625681" cy="800512"/>
         </a:xfrm>
         <a:prstGeom prst="rect">
           <a:avLst/>
@@ -2157,12 +1974,12 @@
         </a:fontRef>
       </dsp:style>
       <dsp:txBody>
-        <a:bodyPr spcFirstLastPara="0" vert="horz" wrap="square" lIns="15240" tIns="15240" rIns="15240" bIns="15240" numCol="1" spcCol="1270" anchor="ctr" anchorCtr="0">
+        <a:bodyPr spcFirstLastPara="0" vert="horz" wrap="square" lIns="17145" tIns="17145" rIns="17145" bIns="17145" numCol="1" spcCol="1270" anchor="ctr" anchorCtr="0">
           <a:noAutofit/>
         </a:bodyPr>
         <a:lstStyle/>
         <a:p>
-          <a:pPr lvl="0" algn="ctr" defTabSz="1066800">
+          <a:pPr lvl="0" algn="ctr" defTabSz="1200150">
             <a:lnSpc>
               <a:spcPct val="90000"/>
             </a:lnSpc>
@@ -2174,15 +1991,15 @@
             </a:spcAft>
           </a:pPr>
           <a:r>
-            <a:rPr lang="de-DE" sz="2400" kern="1200" dirty="0" err="1" smtClean="0"/>
+            <a:rPr lang="de-DE" sz="2700" kern="1200" dirty="0" err="1" smtClean="0"/>
             <a:t>Hardship</a:t>
           </a:r>
-          <a:endParaRPr lang="de-DE" sz="2400" kern="1200" dirty="0"/>
+          <a:endParaRPr lang="de-DE" sz="2700" kern="1200" dirty="0"/>
         </a:p>
       </dsp:txBody>
       <dsp:txXfrm>
-        <a:off x="1482033" y="576"/>
-        <a:ext cx="2302599" cy="702012"/>
+        <a:off x="1402050" y="205394"/>
+        <a:ext cx="2625681" cy="800512"/>
       </dsp:txXfrm>
     </dsp:sp>
     <dsp:sp modelId="{D675B78E-6E43-634B-8A42-ED4F8054297D}">
@@ -2192,8 +2009,8 @@
       </dsp:nvSpPr>
       <dsp:spPr>
         <a:xfrm>
-          <a:off x="1482033" y="878091"/>
-          <a:ext cx="2302599" cy="702012"/>
+          <a:off x="1402050" y="1206035"/>
+          <a:ext cx="2625681" cy="800512"/>
         </a:xfrm>
         <a:prstGeom prst="rect">
           <a:avLst/>
@@ -2267,12 +2084,12 @@
         </a:fontRef>
       </dsp:style>
       <dsp:txBody>
-        <a:bodyPr spcFirstLastPara="0" vert="horz" wrap="square" lIns="15240" tIns="15240" rIns="15240" bIns="15240" numCol="1" spcCol="1270" anchor="ctr" anchorCtr="0">
+        <a:bodyPr spcFirstLastPara="0" vert="horz" wrap="square" lIns="17145" tIns="17145" rIns="17145" bIns="17145" numCol="1" spcCol="1270" anchor="ctr" anchorCtr="0">
           <a:noAutofit/>
         </a:bodyPr>
         <a:lstStyle/>
         <a:p>
-          <a:pPr lvl="0" algn="ctr" defTabSz="1066800">
+          <a:pPr lvl="0" algn="ctr" defTabSz="1200150">
             <a:lnSpc>
               <a:spcPct val="90000"/>
             </a:lnSpc>
@@ -2284,15 +2101,15 @@
             </a:spcAft>
           </a:pPr>
           <a:r>
-            <a:rPr lang="de-DE" sz="2400" kern="1200" dirty="0" err="1" smtClean="0"/>
+            <a:rPr lang="de-DE" sz="2700" kern="1200" dirty="0" err="1" smtClean="0"/>
             <a:t>Legitimacy</a:t>
           </a:r>
-          <a:endParaRPr lang="de-DE" sz="2400" kern="1200" dirty="0"/>
+          <a:endParaRPr lang="de-DE" sz="2700" kern="1200" dirty="0"/>
         </a:p>
       </dsp:txBody>
       <dsp:txXfrm>
-        <a:off x="1482033" y="878091"/>
-        <a:ext cx="2302599" cy="702012"/>
+        <a:off x="1402050" y="1206035"/>
+        <a:ext cx="2625681" cy="800512"/>
       </dsp:txXfrm>
     </dsp:sp>
     <dsp:sp modelId="{3570616F-1FCB-E24E-88BD-834DA0ED7535}">
@@ -2302,8 +2119,8 @@
       </dsp:nvSpPr>
       <dsp:spPr>
         <a:xfrm>
-          <a:off x="1482033" y="1755606"/>
-          <a:ext cx="2302599" cy="702012"/>
+          <a:off x="1402050" y="2206676"/>
+          <a:ext cx="2625681" cy="800512"/>
         </a:xfrm>
         <a:prstGeom prst="rect">
           <a:avLst/>
@@ -2377,12 +2194,12 @@
         </a:fontRef>
       </dsp:style>
       <dsp:txBody>
-        <a:bodyPr spcFirstLastPara="0" vert="horz" wrap="square" lIns="15240" tIns="15240" rIns="15240" bIns="15240" numCol="1" spcCol="1270" anchor="ctr" anchorCtr="0">
+        <a:bodyPr spcFirstLastPara="0" vert="horz" wrap="square" lIns="17145" tIns="17145" rIns="17145" bIns="17145" numCol="1" spcCol="1270" anchor="ctr" anchorCtr="0">
           <a:noAutofit/>
         </a:bodyPr>
         <a:lstStyle/>
         <a:p>
-          <a:pPr lvl="0" algn="ctr" defTabSz="1066800">
+          <a:pPr lvl="0" algn="ctr" defTabSz="1200150">
             <a:lnSpc>
               <a:spcPct val="90000"/>
             </a:lnSpc>
@@ -2394,19 +2211,19 @@
             </a:spcAft>
           </a:pPr>
           <a:r>
-            <a:rPr lang="de-DE" sz="2400" kern="1200" dirty="0" err="1" smtClean="0"/>
+            <a:rPr lang="de-DE" sz="2700" kern="1200" dirty="0" err="1" smtClean="0"/>
             <a:t>Risk</a:t>
           </a:r>
           <a:r>
-            <a:rPr lang="de-DE" sz="2400" kern="1200" dirty="0" smtClean="0"/>
+            <a:rPr lang="de-DE" sz="2700" kern="1200" dirty="0" smtClean="0"/>
             <a:t> Aversion</a:t>
           </a:r>
-          <a:endParaRPr lang="de-DE" sz="2400" kern="1200" dirty="0"/>
+          <a:endParaRPr lang="de-DE" sz="2700" kern="1200" dirty="0"/>
         </a:p>
       </dsp:txBody>
       <dsp:txXfrm>
-        <a:off x="1482033" y="1755606"/>
-        <a:ext cx="2302599" cy="702012"/>
+        <a:off x="1402050" y="2206676"/>
+        <a:ext cx="2625681" cy="800512"/>
       </dsp:txXfrm>
     </dsp:sp>
     <dsp:sp modelId="{02883786-C2FF-334D-8263-725FBF29D864}">
@@ -2416,8 +2233,8 @@
       </dsp:nvSpPr>
       <dsp:spPr>
         <a:xfrm>
-          <a:off x="1482033" y="2633121"/>
-          <a:ext cx="2302599" cy="702012"/>
+          <a:off x="1402050" y="3207317"/>
+          <a:ext cx="2625681" cy="800512"/>
         </a:xfrm>
         <a:prstGeom prst="rect">
           <a:avLst/>
@@ -2491,12 +2308,12 @@
         </a:fontRef>
       </dsp:style>
       <dsp:txBody>
-        <a:bodyPr spcFirstLastPara="0" vert="horz" wrap="square" lIns="15240" tIns="15240" rIns="15240" bIns="15240" numCol="1" spcCol="1270" anchor="ctr" anchorCtr="0">
+        <a:bodyPr spcFirstLastPara="0" vert="horz" wrap="square" lIns="17145" tIns="17145" rIns="17145" bIns="17145" numCol="1" spcCol="1270" anchor="ctr" anchorCtr="0">
           <a:noAutofit/>
         </a:bodyPr>
         <a:lstStyle/>
         <a:p>
-          <a:pPr lvl="0" algn="ctr" defTabSz="1066800">
+          <a:pPr lvl="0" algn="ctr" defTabSz="1200150">
             <a:lnSpc>
               <a:spcPct val="90000"/>
             </a:lnSpc>
@@ -2508,141 +2325,23 @@
             </a:spcAft>
           </a:pPr>
           <a:r>
-            <a:rPr lang="de-DE" sz="2400" kern="1200" dirty="0" err="1" smtClean="0"/>
+            <a:rPr lang="de-DE" sz="2700" kern="1200" dirty="0" err="1" smtClean="0"/>
             <a:t>Violence</a:t>
           </a:r>
           <a:r>
-            <a:rPr lang="de-DE" sz="2400" kern="1200" dirty="0" smtClean="0"/>
+            <a:rPr lang="de-DE" sz="2700" kern="1200" dirty="0" smtClean="0"/>
             <a:t> </a:t>
           </a:r>
           <a:r>
-            <a:rPr lang="de-DE" sz="2400" kern="1200" dirty="0" err="1" smtClean="0"/>
+            <a:rPr lang="de-DE" sz="2700" kern="1200" dirty="0" err="1" smtClean="0"/>
             <a:t>Threshold</a:t>
           </a:r>
-          <a:endParaRPr lang="de-DE" sz="2400" kern="1200" dirty="0"/>
+          <a:endParaRPr lang="de-DE" sz="2700" kern="1200" dirty="0"/>
         </a:p>
       </dsp:txBody>
       <dsp:txXfrm>
-        <a:off x="1482033" y="2633121"/>
-        <a:ext cx="2302599" cy="702012"/>
-      </dsp:txXfrm>
-    </dsp:sp>
-    <dsp:sp modelId="{ECE76F66-D6DB-F54A-9A6B-BD26856E0A24}">
-      <dsp:nvSpPr>
-        <dsp:cNvPr id="0" name=""/>
-        <dsp:cNvSpPr/>
-      </dsp:nvSpPr>
-      <dsp:spPr>
-        <a:xfrm>
-          <a:off x="1482033" y="3510636"/>
-          <a:ext cx="2302599" cy="702012"/>
-        </a:xfrm>
-        <a:prstGeom prst="rect">
-          <a:avLst/>
-        </a:prstGeom>
-        <a:gradFill rotWithShape="0">
-          <a:gsLst>
-            <a:gs pos="0">
-              <a:schemeClr val="lt1">
-                <a:hueOff val="0"/>
-                <a:satOff val="0"/>
-                <a:lumOff val="0"/>
-                <a:alphaOff val="0"/>
-                <a:shade val="51000"/>
-                <a:satMod val="130000"/>
-              </a:schemeClr>
-            </a:gs>
-            <a:gs pos="80000">
-              <a:schemeClr val="lt1">
-                <a:hueOff val="0"/>
-                <a:satOff val="0"/>
-                <a:lumOff val="0"/>
-                <a:alphaOff val="0"/>
-                <a:shade val="93000"/>
-                <a:satMod val="130000"/>
-              </a:schemeClr>
-            </a:gs>
-            <a:gs pos="100000">
-              <a:schemeClr val="lt1">
-                <a:hueOff val="0"/>
-                <a:satOff val="0"/>
-                <a:lumOff val="0"/>
-                <a:alphaOff val="0"/>
-                <a:shade val="94000"/>
-                <a:satMod val="135000"/>
-              </a:schemeClr>
-            </a:gs>
-          </a:gsLst>
-          <a:lin ang="16200000" scaled="0"/>
-        </a:gradFill>
-        <a:ln>
-          <a:noFill/>
-        </a:ln>
-        <a:effectLst>
-          <a:outerShdw blurRad="40000" dist="20000" dir="5400000" rotWithShape="0">
-            <a:srgbClr val="000000">
-              <a:alpha val="38000"/>
-            </a:srgbClr>
-          </a:outerShdw>
-        </a:effectLst>
-        <a:scene3d>
-          <a:camera prst="orthographicFront"/>
-          <a:lightRig rig="flat" dir="t"/>
-        </a:scene3d>
-        <a:sp3d prstMaterial="plastic">
-          <a:bevelT w="120900" h="88900"/>
-          <a:bevelB w="88900" h="31750" prst="angle"/>
-        </a:sp3d>
-      </dsp:spPr>
-      <dsp:style>
-        <a:lnRef idx="0">
-          <a:scrgbClr r="0" g="0" b="0"/>
-        </a:lnRef>
-        <a:fillRef idx="3">
-          <a:scrgbClr r="0" g="0" b="0"/>
-        </a:fillRef>
-        <a:effectRef idx="1">
-          <a:scrgbClr r="0" g="0" b="0"/>
-        </a:effectRef>
-        <a:fontRef idx="minor">
-          <a:schemeClr val="lt1"/>
-        </a:fontRef>
-      </dsp:style>
-      <dsp:txBody>
-        <a:bodyPr spcFirstLastPara="0" vert="horz" wrap="square" lIns="15240" tIns="15240" rIns="15240" bIns="15240" numCol="1" spcCol="1270" anchor="ctr" anchorCtr="0">
-          <a:noAutofit/>
-        </a:bodyPr>
-        <a:lstStyle/>
-        <a:p>
-          <a:pPr lvl="0" algn="ctr" defTabSz="1066800">
-            <a:lnSpc>
-              <a:spcPct val="90000"/>
-            </a:lnSpc>
-            <a:spcBef>
-              <a:spcPct val="0"/>
-            </a:spcBef>
-            <a:spcAft>
-              <a:spcPct val="35000"/>
-            </a:spcAft>
-          </a:pPr>
-          <a:r>
-            <a:rPr lang="de-DE" sz="2400" kern="1200" dirty="0" err="1" smtClean="0"/>
-            <a:t>Active</a:t>
-          </a:r>
-          <a:r>
-            <a:rPr lang="de-DE" sz="2400" kern="1200" dirty="0" smtClean="0"/>
-            <a:t>/</a:t>
-          </a:r>
-          <a:r>
-            <a:rPr lang="de-DE" sz="2400" kern="1200" dirty="0" err="1" smtClean="0"/>
-            <a:t>Quiet</a:t>
-          </a:r>
-          <a:endParaRPr lang="de-DE" sz="2400" kern="1200" dirty="0"/>
-        </a:p>
-      </dsp:txBody>
-      <dsp:txXfrm>
-        <a:off x="1482033" y="3510636"/>
-        <a:ext cx="2302599" cy="702012"/>
+        <a:off x="1402050" y="3207317"/>
+        <a:ext cx="2625681" cy="800512"/>
       </dsp:txXfrm>
     </dsp:sp>
   </dsp:spTree>
@@ -4171,7 +3870,7 @@
           <a:p>
             <a:fld id="{3604AE5E-AF67-44F6-8D0C-DA304963BEB5}" type="datetimeFigureOut">
               <a:rPr lang="de-CH" smtClean="0"/>
-              <a:t>09.10.14</a:t>
+              <a:t>19.10.14</a:t>
             </a:fld>
             <a:endParaRPr lang="de-CH"/>
           </a:p>
@@ -4337,7 +4036,7 @@
           <a:p>
             <a:fld id="{BCDB334D-D17F-49C4-91DD-37BB7E818209}" type="datetimeFigureOut">
               <a:rPr lang="de-CH" smtClean="0"/>
-              <a:t>09.10.14</a:t>
+              <a:t>19.10.14</a:t>
             </a:fld>
             <a:endParaRPr lang="de-CH"/>
           </a:p>
@@ -4763,7 +4462,7 @@
           <a:p>
             <a:fld id="{2B1A4373-7DA0-8147-A203-892F98B9FB92}" type="datetime1">
               <a:rPr lang="de-CH" smtClean="0"/>
-              <a:t>09.10.14</a:t>
+              <a:t>19.10.14</a:t>
             </a:fld>
             <a:endParaRPr lang="de-DE" dirty="0"/>
           </a:p>
@@ -4988,7 +4687,7 @@
           <a:p>
             <a:fld id="{CDA664F8-CA06-3C4B-A81D-7422B14FF226}" type="datetime1">
               <a:rPr lang="de-CH" smtClean="0"/>
-              <a:t>09.10.14</a:t>
+              <a:t>19.10.14</a:t>
             </a:fld>
             <a:endParaRPr lang="de-DE" dirty="0"/>
           </a:p>
@@ -5136,7 +4835,7 @@
           <a:p>
             <a:fld id="{2BE559BC-B81D-164C-9D82-4B4D40125105}" type="datetime1">
               <a:rPr lang="de-CH" smtClean="0"/>
-              <a:t>09.10.14</a:t>
+              <a:t>19.10.14</a:t>
             </a:fld>
             <a:endParaRPr lang="de-DE" dirty="0"/>
           </a:p>
@@ -5445,7 +5144,7 @@
           <a:p>
             <a:fld id="{B081C97E-3587-F840-A8B9-B95FC1133C4E}" type="datetime1">
               <a:rPr lang="de-CH" smtClean="0"/>
-              <a:t>09.10.14</a:t>
+              <a:t>19.10.14</a:t>
             </a:fld>
             <a:endParaRPr lang="de-DE" dirty="0"/>
           </a:p>
@@ -5754,7 +5453,7 @@
           <a:p>
             <a:fld id="{AB63BE71-13B6-4A41-9534-9A93044BF9A3}" type="datetime1">
               <a:rPr lang="de-CH" smtClean="0"/>
-              <a:t>09.10.14</a:t>
+              <a:t>19.10.14</a:t>
             </a:fld>
             <a:endParaRPr lang="de-DE" dirty="0"/>
           </a:p>
@@ -6362,7 +6061,7 @@
           <a:p>
             <a:fld id="{0BDBFB0F-8FBD-F543-A48C-99CD38CC84DD}" type="datetime1">
               <a:rPr lang="de-CH" smtClean="0"/>
-              <a:t>09.10.14</a:t>
+              <a:t>19.10.14</a:t>
             </a:fld>
             <a:endParaRPr lang="de-DE" dirty="0"/>
           </a:p>
@@ -6695,7 +6394,7 @@
           <a:p>
             <a:fld id="{BB9D8E60-8B0A-0E47-A081-E6B87658116A}" type="datetime1">
               <a:rPr lang="de-CH" smtClean="0"/>
-              <a:t>09.10.14</a:t>
+              <a:t>19.10.14</a:t>
             </a:fld>
             <a:endParaRPr lang="de-DE" dirty="0"/>
           </a:p>
@@ -6865,7 +6564,7 @@
           <a:p>
             <a:fld id="{E0E53A73-24FC-C047-8EF6-2B4130F57445}" type="datetime1">
               <a:rPr lang="de-CH" smtClean="0"/>
-              <a:t>09.10.14</a:t>
+              <a:t>19.10.14</a:t>
             </a:fld>
             <a:endParaRPr lang="de-DE" dirty="0"/>
           </a:p>
@@ -7042,7 +6741,7 @@
           <a:p>
             <a:fld id="{D46A268B-2BFB-4048-9806-E6F7108F1815}" type="datetime1">
               <a:rPr lang="de-CH" smtClean="0"/>
-              <a:t>09.10.14</a:t>
+              <a:t>19.10.14</a:t>
             </a:fld>
             <a:endParaRPr lang="de-DE" dirty="0"/>
           </a:p>
@@ -7185,7 +6884,7 @@
           <a:p>
             <a:fld id="{11B3C178-98FB-D64E-808B-28A524185687}" type="datetime1">
               <a:rPr lang="de-CH" smtClean="0"/>
-              <a:t>09.10.14</a:t>
+              <a:t>19.10.14</a:t>
             </a:fld>
             <a:endParaRPr lang="de-DE" dirty="0"/>
           </a:p>
@@ -7583,7 +7282,7 @@
           <a:p>
             <a:fld id="{78D86570-988B-0441-84E9-66E0806FBC87}" type="datetime1">
               <a:rPr lang="de-CH" smtClean="0"/>
-              <a:t>09.10.14</a:t>
+              <a:t>19.10.14</a:t>
             </a:fld>
             <a:endParaRPr lang="de-DE" dirty="0"/>
           </a:p>
@@ -8232,19 +7931,34 @@
           <a:p>
             <a:r>
               <a:rPr lang="en-US" dirty="0" smtClean="0"/>
-              <a:t>Stepwise introduction of new interactions regarding information spreading</a:t>
+              <a:t>Introducing a third ethnic group</a:t>
             </a:r>
           </a:p>
           <a:p>
             <a:r>
               <a:rPr lang="en-US" dirty="0" smtClean="0"/>
-              <a:t>Varying parameter to identify values that cause the outburst of ethnic violence</a:t>
+              <a:t>Making violence threshold an individual quantity</a:t>
             </a:r>
+            <a:endParaRPr lang="en-US" dirty="0" smtClean="0"/>
           </a:p>
           <a:p>
             <a:r>
               <a:rPr lang="en-US" dirty="0" smtClean="0"/>
-              <a:t>Compare results to real world examples</a:t>
+              <a:t>Varying </a:t>
+            </a:r>
+            <a:r>
+              <a:rPr lang="en-US" dirty="0" smtClean="0"/>
+              <a:t>model parameters </a:t>
+            </a:r>
+            <a:r>
+              <a:rPr lang="en-US" dirty="0" smtClean="0"/>
+              <a:t>to identify values that cause the outburst of ethnic violence</a:t>
+            </a:r>
+          </a:p>
+          <a:p>
+            <a:r>
+              <a:rPr lang="en-US" dirty="0" smtClean="0"/>
+              <a:t>Trying to formulate criteria under which a multi-ethnic society can remain peaceful</a:t>
             </a:r>
             <a:endParaRPr lang="en-US" dirty="0" smtClean="0"/>
           </a:p>
@@ -8260,7 +7974,7 @@
             <p:ph sz="half" idx="2"/>
             <p:extLst>
               <p:ext uri="{D42A27DB-BD31-4B8C-83A1-F6EECF244321}">
-                <p14:modId xmlns:p14="http://schemas.microsoft.com/office/powerpoint/2010/main" val="1704397850"/>
+                <p14:modId xmlns:p14="http://schemas.microsoft.com/office/powerpoint/2010/main" val="1266363226"/>
               </p:ext>
             </p:extLst>
           </p:nvPr>
@@ -8292,7 +8006,7 @@
           <a:p>
             <a:fld id="{B870C607-48C9-6C4D-8E62-8FFBB8D6182B}" type="datetime1">
               <a:rPr lang="de-CH" smtClean="0"/>
-              <a:t>09.10.14</a:t>
+              <a:t>19.10.14</a:t>
             </a:fld>
             <a:endParaRPr lang="de-DE" dirty="0"/>
           </a:p>

</xml_diff>